<commit_message>
maj fin de journee
</commit_message>
<xml_diff>
--- a/16-React/J - 2.pptx
+++ b/16-React/J - 2.pptx
@@ -3380,7 +3380,7 @@
             </a:r>
             <a:r>
               <a:rPr lang="fr-FR" sz="1400" dirty="0"/>
-              <a:t> = </a:t>
+              <a:t> </a:t>
             </a:r>
             <a:r>
               <a:rPr lang="fr-FR" sz="1400" b="1" u="sng" dirty="0" err="1">
@@ -3541,7 +3541,15 @@
             </a:r>
             <a:r>
               <a:rPr lang="fr-FR" dirty="0"/>
-              <a:t> (séparation des concepts) est possible grâce au système import export</a:t>
+              <a:t> (séparation des concepts) est possible grâce au système import export (voir site </a:t>
+            </a:r>
+            <a:r>
+              <a:rPr lang="fr-FR" dirty="0" err="1"/>
+              <a:t>mdn</a:t>
+            </a:r>
+            <a:r>
+              <a:rPr lang="fr-FR" dirty="0"/>
+              <a:t> : référence)</a:t>
             </a:r>
           </a:p>
         </p:txBody>

</xml_diff>